<commit_message>
New Stages. Repo organization.
</commit_message>
<xml_diff>
--- a/Stages/Indoor/Speed Shoot - 16 or less/Speed Shoot - 16 rounds v1.pptx
+++ b/Stages/Indoor/Speed Shoot - 16 or less/Speed Shoot - 16 rounds v1.pptx
@@ -242,7 +242,7 @@
             <a:fld id="{6FD315A2-9F92-4CCE-886A-5EF00EA90DC0}" type="datetimeFigureOut">
               <a:rPr lang="en-US" smtClean="0"/>
               <a:pPr/>
-              <a:t>1/9/23</a:t>
+              <a:t>11/21/23</a:t>
             </a:fld>
             <a:endParaRPr lang="en-US"/>
           </a:p>
@@ -3721,7 +3721,7 @@
           <p:nvPr>
             <p:extLst>
               <p:ext uri="{D42A27DB-BD31-4B8C-83A1-F6EECF244321}">
-                <p14:modId xmlns:p14="http://schemas.microsoft.com/office/powerpoint/2010/main" val="1994804785"/>
+                <p14:modId xmlns:p14="http://schemas.microsoft.com/office/powerpoint/2010/main" val="2060324612"/>
               </p:ext>
             </p:extLst>
           </p:nvPr>
@@ -4738,10 +4738,10 @@
                           <a:latin typeface="Arial" charset="0"/>
                           <a:cs typeface="Times New Roman" charset="0"/>
                         </a:rPr>
-                        <a:t>Upon start signal, from inside the box engage target Array 1 (T1-T4) or target Array 2 (T5-T8), then perform a </a:t>
+                        <a:t>Upon start signal, from inside the box engage target Array 1 (T1-T4) or target Array 2 (T5-T8), then perform </a:t>
                       </a:r>
                       <a:r>
-                        <a:rPr kumimoji="0" lang="en-US" sz="1100" b="0" i="0" u="sng" strike="noStrike" cap="none" normalizeH="0" baseline="0" dirty="0" err="1">
+                        <a:rPr kumimoji="0" lang="en-US" sz="1100" b="0" i="0" u="none" strike="noStrike" cap="none" normalizeH="0" baseline="0">
                           <a:ln>
                             <a:noFill/>
                           </a:ln>
@@ -4752,7 +4752,7 @@
                           <a:latin typeface="Arial" charset="0"/>
                           <a:cs typeface="Times New Roman" charset="0"/>
                         </a:rPr>
-                        <a:t>manditory</a:t>
+                        <a:t>a </a:t>
                       </a:r>
                       <a:r>
                         <a:rPr kumimoji="0" lang="en-US" sz="1100" b="0" i="0" u="sng" strike="noStrike" cap="none" normalizeH="0" baseline="0">
@@ -4766,10 +4766,10 @@
                           <a:latin typeface="Arial" charset="0"/>
                           <a:cs typeface="Times New Roman" charset="0"/>
                         </a:rPr>
-                        <a:t> reload</a:t>
+                        <a:t>mandatory </a:t>
                       </a:r>
                       <a:r>
-                        <a:rPr kumimoji="0" lang="en-US" sz="1100" b="0" i="0" u="none" strike="noStrike" cap="none" normalizeH="0" baseline="0">
+                        <a:rPr kumimoji="0" lang="en-US" sz="1100" b="0" i="0" u="sng" strike="noStrike" cap="none" normalizeH="0" baseline="0" dirty="0">
                           <a:ln>
                             <a:noFill/>
                           </a:ln>
@@ -4780,7 +4780,7 @@
                           <a:latin typeface="Arial" charset="0"/>
                           <a:cs typeface="Times New Roman" charset="0"/>
                         </a:rPr>
-                        <a:t> </a:t>
+                        <a:t>reload</a:t>
                       </a:r>
                       <a:r>
                         <a:rPr kumimoji="0" lang="en-US" sz="1100" b="0" i="0" u="none" strike="noStrike" cap="none" normalizeH="0" baseline="0" dirty="0">
@@ -4794,7 +4794,7 @@
                           <a:latin typeface="Arial" charset="0"/>
                           <a:cs typeface="Times New Roman" charset="0"/>
                         </a:rPr>
-                        <a:t>and engage the remaining targets.</a:t>
+                        <a:t> and engage the remaining targets.</a:t>
                       </a:r>
                     </a:p>
                   </a:txBody>

</xml_diff>